<commit_message>
mysite5 board과제 서비스부분 수정 commit
</commit_message>
<xml_diff>
--- a/mysite5-board 시퀀스 다이어그램.pptx
+++ b/mysite5-board 시퀀스 다이어그램.pptx
@@ -2,7 +2,7 @@
 <file path=ppt/presentation.xml><?xml version="1.0" encoding="utf-8"?>
 <p:presentation xmlns:r="http://schemas.openxmlformats.org/officeDocument/2006/relationships" xmlns:c="http://schemas.openxmlformats.org/drawingml/2006/chart" xmlns:a="http://schemas.openxmlformats.org/drawingml/2006/main" xmlns:dgm="http://schemas.openxmlformats.org/drawingml/2006/diagram" xmlns:dsp="http://schemas.microsoft.com/office/drawing/2008/diagram" xmlns:p="http://schemas.openxmlformats.org/presentationml/2006/main" saveSubsetFonts="1">
   <p:sldMasterIdLst>
-    <p:sldMasterId id="2147483758" r:id="rId1"/>
+    <p:sldMasterId id="2147483733" r:id="rId1"/>
   </p:sldMasterIdLst>
   <p:notesMasterIdLst>
     <p:notesMasterId r:id="rId2"/>
@@ -205,7 +205,7 @@
               <a:pPr lvl="0">
                 <a:defRPr lang="ko-KR" altLang="en-US"/>
               </a:pPr>
-              <a:t>2021-01-31</a:t>
+              <a:t>2021-02-01</a:t>
             </a:fld>
             <a:endParaRPr lang="ko-KR" altLang="en-US"/>
           </a:p>
@@ -6522,10 +6522,10 @@
         </p:nvGrpSpPr>
         <p:grpSpPr>
           <a:xfrm rot="0">
-            <a:off x="722834" y="4805362"/>
-            <a:ext cx="32211292" cy="5036820"/>
-            <a:chOff x="722833" y="5924550"/>
-            <a:chExt cx="32211292" cy="5036820"/>
+            <a:off x="722834" y="4872038"/>
+            <a:ext cx="32211292" cy="4970144"/>
+            <a:chOff x="722833" y="5991226"/>
+            <a:chExt cx="32211292" cy="4970144"/>
           </a:xfrm>
         </p:grpSpPr>
         <p:cxnSp>
@@ -6574,8 +6574,8 @@
           </p:nvSpPr>
           <p:spPr>
             <a:xfrm>
-              <a:off x="11264315" y="6311813"/>
-              <a:ext cx="3359956" cy="2287357"/>
+              <a:off x="11378617" y="6273713"/>
+              <a:ext cx="3359956" cy="1453920"/>
             </a:xfrm>
             <a:prstGeom prst="rect">
               <a:avLst/>
@@ -6623,14 +6623,7 @@
               <a:pPr eaLnBrk="1" latinLnBrk="1" hangingPunct="1">
                 <a:defRPr lang="ko-KR"/>
               </a:pPr>
-              <a:r>
-                <a:rPr lang="en-US" altLang="ko-KR" b="1">
-                  <a:latin typeface="+mn-ea"/>
-                  <a:ea typeface="+mn-ea"/>
-                </a:rPr>
-                <a:t>boardService.hitUpdate(no)</a:t>
-              </a:r>
-              <a:endParaRPr lang="en-US" altLang="ko-KR" b="1">
+              <a:endParaRPr lang="ko-KR" altLang="en-US" b="1">
                 <a:latin typeface="+mn-ea"/>
                 <a:ea typeface="+mn-ea"/>
               </a:endParaRPr>
@@ -6639,47 +6632,13 @@
               <a:pPr eaLnBrk="1" latinLnBrk="1" hangingPunct="1">
                 <a:defRPr lang="ko-KR"/>
               </a:pPr>
-              <a:endParaRPr lang="en-US" altLang="ko-KR" b="1">
-                <a:latin typeface="+mn-ea"/>
-                <a:ea typeface="+mn-ea"/>
-              </a:endParaRPr>
-            </a:p>
-            <a:p>
-              <a:pPr eaLnBrk="1" latinLnBrk="1" hangingPunct="1">
-                <a:defRPr lang="ko-KR"/>
-              </a:pPr>
               <a:r>
                 <a:rPr lang="en-US" altLang="ko-KR" b="1">
                   <a:latin typeface="+mn-ea"/>
                   <a:ea typeface="+mn-ea"/>
                 </a:rPr>
-                <a:t>boardVo = boardService.boardSelect</a:t>
-              </a:r>
-              <a:endParaRPr lang="en-US" altLang="ko-KR" b="1">
-                <a:latin typeface="+mn-ea"/>
-                <a:ea typeface="+mn-ea"/>
-              </a:endParaRPr>
-            </a:p>
-            <a:p>
-              <a:pPr eaLnBrk="1" latinLnBrk="1" hangingPunct="1">
-                <a:defRPr lang="ko-KR"/>
-              </a:pPr>
-              <a:r>
-                <a:rPr lang="en-US" altLang="ko-KR" b="1">
-                  <a:latin typeface="+mn-ea"/>
-                  <a:ea typeface="+mn-ea"/>
-                </a:rPr>
-                <a:t>One(no)</a:t>
-              </a:r>
-              <a:endParaRPr lang="en-US" altLang="ko-KR" b="1">
-                <a:latin typeface="+mn-ea"/>
-                <a:ea typeface="+mn-ea"/>
-              </a:endParaRPr>
-            </a:p>
-            <a:p>
-              <a:pPr eaLnBrk="1" latinLnBrk="1" hangingPunct="1">
-                <a:defRPr lang="ko-KR"/>
-              </a:pPr>
+                <a:t>BoardVo boardVo = boardService.boardRead(no)</a:t>
+              </a:r>
               <a:endParaRPr lang="en-US" altLang="ko-KR" b="1">
                 <a:latin typeface="+mn-ea"/>
                 <a:ea typeface="+mn-ea"/>
@@ -7035,14 +6994,14 @@
         </p:sp>
         <p:sp>
           <p:nvSpPr>
-            <p:cNvPr id="484" name="TextBox 319"/>
+            <p:cNvPr id="485" name="TextBox 319"/>
             <p:cNvSpPr txBox="1"/>
             <p:nvPr/>
           </p:nvSpPr>
           <p:spPr>
             <a:xfrm>
-              <a:off x="15783930" y="8110534"/>
-              <a:ext cx="2974164" cy="364811"/>
+              <a:off x="19459564" y="8091495"/>
+              <a:ext cx="2974164" cy="364800"/>
             </a:xfrm>
             <a:prstGeom prst="rect">
               <a:avLst/>
@@ -7074,14 +7033,14 @@
         </p:sp>
         <p:sp>
           <p:nvSpPr>
-            <p:cNvPr id="485" name="TextBox 319"/>
+            <p:cNvPr id="486" name="TextBox 319"/>
             <p:cNvSpPr txBox="1"/>
             <p:nvPr/>
           </p:nvSpPr>
           <p:spPr>
             <a:xfrm>
-              <a:off x="19459564" y="8091495"/>
-              <a:ext cx="2974164" cy="364800"/>
+              <a:off x="23353132" y="8034338"/>
+              <a:ext cx="3847290" cy="641032"/>
             </a:xfrm>
             <a:prstGeom prst="rect">
               <a:avLst/>
@@ -7102,45 +7061,6 @@
                   <a:latin typeface="+mn-ea"/>
                   <a:ea typeface="+mn-ea"/>
                 </a:rPr>
-                <a:t>boardSelectOne(no)</a:t>
-              </a:r>
-              <a:endParaRPr lang="en-US" altLang="ko-KR" b="1">
-                <a:latin typeface="+mn-ea"/>
-                <a:ea typeface="+mn-ea"/>
-              </a:endParaRPr>
-            </a:p>
-          </p:txBody>
-        </p:sp>
-        <p:sp>
-          <p:nvSpPr>
-            <p:cNvPr id="486" name="TextBox 319"/>
-            <p:cNvSpPr txBox="1"/>
-            <p:nvPr/>
-          </p:nvSpPr>
-          <p:spPr>
-            <a:xfrm>
-              <a:off x="23353132" y="8034338"/>
-              <a:ext cx="3847290" cy="641032"/>
-            </a:xfrm>
-            <a:prstGeom prst="rect">
-              <a:avLst/>
-            </a:prstGeom>
-            <a:noFill/>
-          </p:spPr>
-          <p:txBody>
-            <a:bodyPr wrap="square">
-              <a:spAutoFit/>
-            </a:bodyPr>
-            <a:lstStyle/>
-            <a:p>
-              <a:pPr algn="ctr" eaLnBrk="1" latinLnBrk="1" hangingPunct="1">
-                <a:defRPr lang="ko-KR"/>
-              </a:pPr>
-              <a:r>
-                <a:rPr lang="en-US" altLang="ko-KR" b="1">
-                  <a:latin typeface="+mn-ea"/>
-                  <a:ea typeface="+mn-ea"/>
-                </a:rPr>
                 <a:t>selectOne("board.selectOne",</a:t>
               </a:r>
               <a:endParaRPr lang="en-US" altLang="ko-KR" b="1">
@@ -7245,8 +7165,8 @@
           </p:nvCxnSpPr>
           <p:spPr>
             <a:xfrm>
-              <a:off x="14482764" y="7720806"/>
-              <a:ext cx="1571624" cy="476250"/>
+              <a:off x="14558964" y="6996906"/>
+              <a:ext cx="1643270" cy="0"/>
             </a:xfrm>
             <a:prstGeom prst="straightConnector1">
               <a:avLst/>
@@ -7281,8 +7201,8 @@
           </p:nvCxnSpPr>
           <p:spPr>
             <a:xfrm>
-              <a:off x="18401982" y="8163565"/>
-              <a:ext cx="1495746" cy="0"/>
+              <a:off x="18673764" y="7458869"/>
+              <a:ext cx="1223966" cy="704695"/>
             </a:xfrm>
             <a:prstGeom prst="straightConnector1">
               <a:avLst/>
@@ -7389,8 +7309,8 @@
           </p:nvCxnSpPr>
           <p:spPr>
             <a:xfrm rot="10800000">
-              <a:off x="18337312" y="8421928"/>
-              <a:ext cx="1484464" cy="0"/>
+              <a:off x="18530888" y="7649369"/>
+              <a:ext cx="1290886" cy="772559"/>
             </a:xfrm>
             <a:prstGeom prst="straightConnector1">
               <a:avLst/>
@@ -7425,8 +7345,8 @@
           </p:nvCxnSpPr>
           <p:spPr>
             <a:xfrm rot="10800000">
-              <a:off x="14506576" y="7958932"/>
-              <a:ext cx="1629238" cy="513788"/>
+              <a:off x="14525622" y="7273132"/>
+              <a:ext cx="1591619" cy="0"/>
             </a:xfrm>
             <a:prstGeom prst="straightConnector1">
               <a:avLst/>
@@ -7575,8 +7495,8 @@
             <p:nvPr/>
           </p:nvSpPr>
           <p:spPr>
-            <a:xfrm>
-              <a:off x="18027126" y="7815262"/>
+            <a:xfrm rot="1881139">
+              <a:off x="18360496" y="7458074"/>
               <a:ext cx="2140862" cy="367539"/>
             </a:xfrm>
             <a:prstGeom prst="rect">
@@ -7883,9 +7803,9 @@
             <p:nvPr/>
           </p:nvSpPr>
           <p:spPr>
-            <a:xfrm>
-              <a:off x="18055666" y="8528621"/>
-              <a:ext cx="2140862" cy="365824"/>
+            <a:xfrm rot="1742904">
+              <a:off x="17865160" y="8219057"/>
+              <a:ext cx="2140862" cy="365825"/>
             </a:xfrm>
             <a:prstGeom prst="rect">
               <a:avLst/>
@@ -7922,9 +7842,9 @@
             <p:nvPr/>
           </p:nvSpPr>
           <p:spPr>
-            <a:xfrm rot="970530">
-              <a:off x="14255192" y="8519096"/>
-              <a:ext cx="2140862" cy="365824"/>
+            <a:xfrm rot="21569026">
+              <a:off x="14564755" y="7638033"/>
+              <a:ext cx="2140862" cy="365825"/>
             </a:xfrm>
             <a:prstGeom prst="rect">
               <a:avLst/>
@@ -8001,8 +7921,8 @@
           </p:nvSpPr>
           <p:spPr>
             <a:xfrm>
-              <a:off x="15707378" y="6219821"/>
-              <a:ext cx="2974164" cy="364812"/>
+              <a:off x="15859778" y="6867520"/>
+              <a:ext cx="2974164" cy="364813"/>
             </a:xfrm>
             <a:prstGeom prst="rect">
               <a:avLst/>
@@ -8023,7 +7943,7 @@
                   <a:latin typeface="+mn-ea"/>
                   <a:ea typeface="+mn-ea"/>
                 </a:rPr>
-                <a:t>hitUpdate(no)</a:t>
+                <a:t>boardRead(no)</a:t>
               </a:r>
               <a:endParaRPr lang="en-US" altLang="ko-KR" b="1">
                 <a:latin typeface="+mn-ea"/>
@@ -8183,50 +8103,14 @@
         </p:sp>
         <p:cxnSp>
           <p:nvCxnSpPr>
-            <p:cNvPr id="615" name="직선 화살표 연결선 318"/>
-            <p:cNvCxnSpPr/>
-            <p:nvPr/>
-          </p:nvCxnSpPr>
-          <p:spPr>
-            <a:xfrm flipV="1">
-              <a:off x="14506576" y="6339681"/>
-              <a:ext cx="1666875" cy="595312"/>
-            </a:xfrm>
-            <a:prstGeom prst="straightConnector1">
-              <a:avLst/>
-            </a:prstGeom>
-            <a:ln w="38100">
-              <a:solidFill>
-                <a:srgbClr val="c00000"/>
-              </a:solidFill>
-              <a:tailEnd type="arrow"/>
-            </a:ln>
-          </p:spPr>
-          <p:style>
-            <a:lnRef idx="1">
-              <a:schemeClr val="accent1"/>
-            </a:lnRef>
-            <a:fillRef idx="0">
-              <a:schemeClr val="accent1"/>
-            </a:fillRef>
-            <a:effectRef idx="0">
-              <a:schemeClr val="accent1"/>
-            </a:effectRef>
-            <a:fontRef idx="minor">
-              <a:schemeClr val="tx1"/>
-            </a:fontRef>
-          </p:style>
-        </p:cxnSp>
-        <p:cxnSp>
-          <p:nvCxnSpPr>
             <p:cNvPr id="616" name="직선 화살표 연결선 318"/>
             <p:cNvCxnSpPr/>
             <p:nvPr/>
           </p:nvCxnSpPr>
           <p:spPr>
-            <a:xfrm>
-              <a:off x="18458792" y="6272853"/>
-              <a:ext cx="1495746" cy="0"/>
+            <a:xfrm flipV="1">
+              <a:off x="18554702" y="6272852"/>
+              <a:ext cx="1399836" cy="566891"/>
             </a:xfrm>
             <a:prstGeom prst="straightConnector1">
               <a:avLst/>
@@ -8332,45 +8216,9 @@
             <p:nvPr/>
           </p:nvCxnSpPr>
           <p:spPr>
-            <a:xfrm rot="10800000">
-              <a:off x="18394120" y="6531215"/>
-              <a:ext cx="1484464" cy="0"/>
-            </a:xfrm>
-            <a:prstGeom prst="straightConnector1">
-              <a:avLst/>
-            </a:prstGeom>
-            <a:ln w="38100">
-              <a:solidFill>
-                <a:srgbClr val="0070c0"/>
-              </a:solidFill>
-              <a:tailEnd type="arrow"/>
-            </a:ln>
-          </p:spPr>
-          <p:style>
-            <a:lnRef idx="1">
-              <a:schemeClr val="accent1"/>
-            </a:lnRef>
-            <a:fillRef idx="0">
-              <a:schemeClr val="accent1"/>
-            </a:fillRef>
-            <a:effectRef idx="0">
-              <a:schemeClr val="accent1"/>
-            </a:effectRef>
-            <a:fontRef idx="minor">
-              <a:schemeClr val="tx1"/>
-            </a:fontRef>
-          </p:style>
-        </p:cxnSp>
-        <p:cxnSp>
-          <p:nvCxnSpPr>
-            <p:cNvPr id="620" name="직선 화살표 연결선 324"/>
-            <p:cNvCxnSpPr/>
-            <p:nvPr/>
-          </p:nvCxnSpPr>
-          <p:spPr>
             <a:xfrm rot="10800000" flipV="1">
-              <a:off x="14601828" y="6577806"/>
-              <a:ext cx="1643061" cy="619125"/>
+              <a:off x="18554704" y="6531216"/>
+              <a:ext cx="1323882" cy="522840"/>
             </a:xfrm>
             <a:prstGeom prst="straightConnector1">
               <a:avLst/>
@@ -8476,8 +8324,8 @@
             <p:nvPr/>
           </p:nvSpPr>
           <p:spPr>
-            <a:xfrm>
-              <a:off x="18083936" y="5924550"/>
+            <a:xfrm rot="20668908">
+              <a:off x="18083936" y="5995987"/>
               <a:ext cx="2140862" cy="367539"/>
             </a:xfrm>
             <a:prstGeom prst="rect">

</xml_diff>